<commit_message>
Update developer guide and user guide
</commit_message>
<xml_diff>
--- a/docs/diagrams/ModelComponentClassDiagram.pptx
+++ b/docs/diagrams/ModelComponentClassDiagram.pptx
@@ -109,7 +109,7 @@
   </p:defaultTextStyle>
   <p:extLst>
     <p:ext uri="{EFAFB233-063F-42B5-8137-9DF3F51BA10A}">
-      <p15:sldGuideLst xmlns="" xmlns:p15="http://schemas.microsoft.com/office/powerpoint/2012/main">
+      <p15:sldGuideLst xmlns:p15="http://schemas.microsoft.com/office/powerpoint/2012/main">
         <p15:guide id="1" orient="horz" pos="1488">
           <p15:clr>
             <a:srgbClr val="A4A3A4"/>
@@ -208,7 +208,7 @@
           <a:p>
             <a:fld id="{F5CC4B3F-88C1-4FFA-B1B6-F41C21DC6924}" type="datetimeFigureOut">
               <a:rPr lang="en-US" smtClean="0"/>
-              <a:t>4/4/2018</a:t>
+              <a:t>4/15/2018</a:t>
             </a:fld>
             <a:endParaRPr lang="en-US"/>
           </a:p>
@@ -654,7 +654,7 @@
           <a:p>
             <a:fld id="{78C97017-6FC3-485B-9764-EAC9E56C1D49}" type="datetimeFigureOut">
               <a:rPr lang="en-US" smtClean="0"/>
-              <a:t>4/4/2018</a:t>
+              <a:t>4/15/2018</a:t>
             </a:fld>
             <a:endParaRPr lang="en-US"/>
           </a:p>
@@ -822,7 +822,7 @@
           <a:p>
             <a:fld id="{78C97017-6FC3-485B-9764-EAC9E56C1D49}" type="datetimeFigureOut">
               <a:rPr lang="en-US" smtClean="0"/>
-              <a:t>4/4/2018</a:t>
+              <a:t>4/15/2018</a:t>
             </a:fld>
             <a:endParaRPr lang="en-US"/>
           </a:p>
@@ -1000,7 +1000,7 @@
           <a:p>
             <a:fld id="{78C97017-6FC3-485B-9764-EAC9E56C1D49}" type="datetimeFigureOut">
               <a:rPr lang="en-US" smtClean="0"/>
-              <a:t>4/4/2018</a:t>
+              <a:t>4/15/2018</a:t>
             </a:fld>
             <a:endParaRPr lang="en-US"/>
           </a:p>
@@ -1168,7 +1168,7 @@
           <a:p>
             <a:fld id="{78C97017-6FC3-485B-9764-EAC9E56C1D49}" type="datetimeFigureOut">
               <a:rPr lang="en-US" smtClean="0"/>
-              <a:t>4/4/2018</a:t>
+              <a:t>4/15/2018</a:t>
             </a:fld>
             <a:endParaRPr lang="en-US"/>
           </a:p>
@@ -1413,7 +1413,7 @@
           <a:p>
             <a:fld id="{78C97017-6FC3-485B-9764-EAC9E56C1D49}" type="datetimeFigureOut">
               <a:rPr lang="en-US" smtClean="0"/>
-              <a:t>4/4/2018</a:t>
+              <a:t>4/15/2018</a:t>
             </a:fld>
             <a:endParaRPr lang="en-US"/>
           </a:p>
@@ -1698,7 +1698,7 @@
           <a:p>
             <a:fld id="{78C97017-6FC3-485B-9764-EAC9E56C1D49}" type="datetimeFigureOut">
               <a:rPr lang="en-US" smtClean="0"/>
-              <a:t>4/4/2018</a:t>
+              <a:t>4/15/2018</a:t>
             </a:fld>
             <a:endParaRPr lang="en-US"/>
           </a:p>
@@ -2117,7 +2117,7 @@
           <a:p>
             <a:fld id="{78C97017-6FC3-485B-9764-EAC9E56C1D49}" type="datetimeFigureOut">
               <a:rPr lang="en-US" smtClean="0"/>
-              <a:t>4/4/2018</a:t>
+              <a:t>4/15/2018</a:t>
             </a:fld>
             <a:endParaRPr lang="en-US"/>
           </a:p>
@@ -2234,7 +2234,7 @@
           <a:p>
             <a:fld id="{78C97017-6FC3-485B-9764-EAC9E56C1D49}" type="datetimeFigureOut">
               <a:rPr lang="en-US" smtClean="0"/>
-              <a:t>4/4/2018</a:t>
+              <a:t>4/15/2018</a:t>
             </a:fld>
             <a:endParaRPr lang="en-US"/>
           </a:p>
@@ -2329,7 +2329,7 @@
           <a:p>
             <a:fld id="{78C97017-6FC3-485B-9764-EAC9E56C1D49}" type="datetimeFigureOut">
               <a:rPr lang="en-US" smtClean="0"/>
-              <a:t>4/4/2018</a:t>
+              <a:t>4/15/2018</a:t>
             </a:fld>
             <a:endParaRPr lang="en-US"/>
           </a:p>
@@ -2604,7 +2604,7 @@
           <a:p>
             <a:fld id="{78C97017-6FC3-485B-9764-EAC9E56C1D49}" type="datetimeFigureOut">
               <a:rPr lang="en-US" smtClean="0"/>
-              <a:t>4/4/2018</a:t>
+              <a:t>4/15/2018</a:t>
             </a:fld>
             <a:endParaRPr lang="en-US"/>
           </a:p>
@@ -2856,7 +2856,7 @@
           <a:p>
             <a:fld id="{78C97017-6FC3-485B-9764-EAC9E56C1D49}" type="datetimeFigureOut">
               <a:rPr lang="en-US" smtClean="0"/>
-              <a:t>4/4/2018</a:t>
+              <a:t>4/15/2018</a:t>
             </a:fld>
             <a:endParaRPr lang="en-US"/>
           </a:p>
@@ -3067,7 +3067,7 @@
           <a:p>
             <a:fld id="{78C97017-6FC3-485B-9764-EAC9E56C1D49}" type="datetimeFigureOut">
               <a:rPr lang="en-US" smtClean="0"/>
-              <a:t>4/4/2018</a:t>
+              <a:t>4/15/2018</a:t>
             </a:fld>
             <a:endParaRPr lang="en-US"/>
           </a:p>
@@ -3450,8 +3450,8 @@
         </p:nvSpPr>
         <p:spPr>
           <a:xfrm>
-            <a:off x="1119865" y="1727200"/>
-            <a:ext cx="7490735" cy="3225800"/>
+            <a:off x="1119865" y="1459240"/>
+            <a:ext cx="7795535" cy="3493760"/>
           </a:xfrm>
           <a:prstGeom prst="roundRect">
             <a:avLst>
@@ -4629,8 +4629,8 @@
         </p:nvSpPr>
         <p:spPr>
           <a:xfrm>
-            <a:off x="7696805" y="2255953"/>
-            <a:ext cx="822002" cy="285783"/>
+            <a:off x="7696804" y="2255953"/>
+            <a:ext cx="1049049" cy="285783"/>
           </a:xfrm>
           <a:prstGeom prst="rect">
             <a:avLst/>
@@ -4662,12 +4662,12 @@
           <a:p>
             <a:pPr algn="ctr"/>
             <a:r>
-              <a:rPr lang="en-US" sz="1050" dirty="0">
+              <a:rPr lang="en-US" sz="1050" dirty="0" err="1">
                 <a:solidFill>
                   <a:srgbClr val="7030A0"/>
                 </a:solidFill>
               </a:rPr>
-              <a:t>Priority</a:t>
+              <a:t>updatedPriority</a:t>
             </a:r>
             <a:endParaRPr lang="en-SG" sz="1050" dirty="0">
               <a:solidFill>
@@ -4728,6 +4728,7 @@
         <p:nvCxnSpPr>
           <p:cNvPr id="79" name="Elbow Connector 78"/>
           <p:cNvCxnSpPr>
+            <a:cxnSpLocks/>
             <a:stCxn id="78" idx="3"/>
             <a:endCxn id="76" idx="1"/>
           </p:cNvCxnSpPr>
@@ -4736,7 +4737,7 @@
         <p:spPr>
           <a:xfrm flipV="1">
             <a:off x="7277995" y="2398845"/>
-            <a:ext cx="418810" cy="636046"/>
+            <a:ext cx="418809" cy="636046"/>
           </a:xfrm>
           <a:prstGeom prst="bentConnector3">
             <a:avLst/>
@@ -4774,7 +4775,7 @@
         <p:spPr>
           <a:xfrm>
             <a:off x="7702537" y="2574182"/>
-            <a:ext cx="822002" cy="285783"/>
+            <a:ext cx="1043316" cy="285783"/>
           </a:xfrm>
           <a:prstGeom prst="rect">
             <a:avLst/>
@@ -4825,6 +4826,7 @@
         <p:nvCxnSpPr>
           <p:cNvPr id="81" name="Elbow Connector 80"/>
           <p:cNvCxnSpPr>
+            <a:cxnSpLocks/>
             <a:stCxn id="78" idx="3"/>
             <a:endCxn id="80" idx="1"/>
           </p:cNvCxnSpPr>
@@ -4871,7 +4873,7 @@
         <p:spPr>
           <a:xfrm>
             <a:off x="7702537" y="2897160"/>
-            <a:ext cx="822002" cy="285783"/>
+            <a:ext cx="1043316" cy="285783"/>
           </a:xfrm>
           <a:prstGeom prst="rect">
             <a:avLst/>
@@ -4922,6 +4924,7 @@
         <p:nvCxnSpPr>
           <p:cNvPr id="84" name="Elbow Connector 83"/>
           <p:cNvCxnSpPr>
+            <a:cxnSpLocks/>
             <a:stCxn id="78" idx="3"/>
             <a:endCxn id="83" idx="1"/>
           </p:cNvCxnSpPr>
@@ -4968,7 +4971,7 @@
         <p:spPr>
           <a:xfrm>
             <a:off x="7702536" y="3220137"/>
-            <a:ext cx="822003" cy="285783"/>
+            <a:ext cx="1043317" cy="285783"/>
           </a:xfrm>
           <a:prstGeom prst="rect">
             <a:avLst/>
@@ -5019,6 +5022,7 @@
         <p:nvCxnSpPr>
           <p:cNvPr id="86" name="Elbow Connector 85"/>
           <p:cNvCxnSpPr>
+            <a:cxnSpLocks/>
             <a:stCxn id="78" idx="3"/>
             <a:endCxn id="85" idx="1"/>
           </p:cNvCxnSpPr>
@@ -5304,14 +5308,6 @@
                 </a:solidFill>
               </a:rPr>
               <a:t>&lt;&lt;interface&gt;&gt;</a:t>
-            </a:r>
-            <a:r>
-              <a:rPr lang="en-US" sz="1050">
-                <a:solidFill>
-                  <a:srgbClr val="7030A0"/>
-                </a:solidFill>
-              </a:rPr>
-              <a:t/>
             </a:r>
             <a:br>
               <a:rPr lang="en-US" sz="1050">
@@ -5740,7 +5736,7 @@
         <p:spPr>
           <a:xfrm>
             <a:off x="7702537" y="3541208"/>
-            <a:ext cx="822002" cy="285783"/>
+            <a:ext cx="1043316" cy="285783"/>
           </a:xfrm>
           <a:prstGeom prst="rect">
             <a:avLst/>
@@ -5795,8 +5791,8 @@
         </p:nvSpPr>
         <p:spPr>
           <a:xfrm>
-            <a:off x="7704269" y="1937725"/>
-            <a:ext cx="822002" cy="285783"/>
+            <a:off x="7704268" y="1937725"/>
+            <a:ext cx="1041585" cy="285783"/>
           </a:xfrm>
           <a:prstGeom prst="rect">
             <a:avLst/>
@@ -5828,12 +5824,12 @@
           <a:p>
             <a:pPr algn="ctr"/>
             <a:r>
-              <a:rPr lang="en-US" sz="1050" dirty="0">
+              <a:rPr lang="en-US" sz="1050" dirty="0" err="1">
                 <a:solidFill>
                   <a:srgbClr val="7030A0"/>
                 </a:solidFill>
               </a:rPr>
-              <a:t>Name</a:t>
+              <a:t>basePriority</a:t>
             </a:r>
             <a:endParaRPr lang="en-SG" sz="1050" dirty="0">
               <a:solidFill>
@@ -5889,13 +5885,13 @@
         <p:nvCxnSpPr>
           <p:cNvPr id="72" name="Elbow Connector 71"/>
           <p:cNvCxnSpPr>
-            <a:endCxn id="53" idx="1"/>
+            <a:cxnSpLocks/>
           </p:cNvCxnSpPr>
           <p:nvPr/>
         </p:nvCxnSpPr>
         <p:spPr>
           <a:xfrm rot="5400000" flipH="1" flipV="1">
-            <a:off x="7438062" y="2127889"/>
+            <a:off x="7438063" y="2127889"/>
             <a:ext cx="313478" cy="218935"/>
           </a:xfrm>
           <a:prstGeom prst="bentConnector2">
@@ -5934,7 +5930,7 @@
         <p:spPr>
           <a:xfrm>
             <a:off x="7704269" y="3865644"/>
-            <a:ext cx="822002" cy="285783"/>
+            <a:ext cx="1043316" cy="285783"/>
           </a:xfrm>
           <a:prstGeom prst="rect">
             <a:avLst/>
@@ -6024,7 +6020,7 @@
           <p:cNvPr id="74" name="Rectangle 8">
             <a:extLst>
               <a:ext uri="{FF2B5EF4-FFF2-40B4-BE49-F238E27FC236}">
-                <a16:creationId xmlns="" xmlns:a16="http://schemas.microsoft.com/office/drawing/2014/main" id="{D1EA267A-1EFE-4F58-9EFF-6A0405CC6ADE}"/>
+                <a16:creationId xmlns:a16="http://schemas.microsoft.com/office/drawing/2014/main" id="{D1EA267A-1EFE-4F58-9EFF-6A0405CC6ADE}"/>
               </a:ext>
             </a:extLst>
           </p:cNvPr>
@@ -6034,7 +6030,7 @@
         <p:spPr>
           <a:xfrm>
             <a:off x="7704269" y="4190571"/>
-            <a:ext cx="822002" cy="285783"/>
+            <a:ext cx="1043316" cy="285783"/>
           </a:xfrm>
           <a:prstGeom prst="rect">
             <a:avLst/>
@@ -6086,7 +6082,7 @@
           <p:cNvPr id="77" name="Elbow Connector 72">
             <a:extLst>
               <a:ext uri="{FF2B5EF4-FFF2-40B4-BE49-F238E27FC236}">
-                <a16:creationId xmlns="" xmlns:a16="http://schemas.microsoft.com/office/drawing/2014/main" id="{8AE386F3-2DFC-4117-9793-35573E1679BB}"/>
+                <a16:creationId xmlns:a16="http://schemas.microsoft.com/office/drawing/2014/main" id="{8AE386F3-2DFC-4117-9793-35573E1679BB}"/>
               </a:ext>
             </a:extLst>
           </p:cNvPr>
@@ -6169,7 +6165,7 @@
           <a:p>
             <a:pPr algn="ctr"/>
             <a:r>
-              <a:rPr lang="en-US" sz="1050" dirty="0" smtClean="0">
+              <a:rPr lang="en-US" sz="1050" dirty="0">
                 <a:solidFill>
                   <a:srgbClr val="7030A0"/>
                 </a:solidFill>
@@ -6189,7 +6185,7 @@
           <p:cNvPr id="87" name="Elbow Connector 72">
             <a:extLst>
               <a:ext uri="{FF2B5EF4-FFF2-40B4-BE49-F238E27FC236}">
-                <a16:creationId xmlns="" xmlns:a16="http://schemas.microsoft.com/office/drawing/2014/main" id="{8AE386F3-2DFC-4117-9793-35573E1679BB}"/>
+                <a16:creationId xmlns:a16="http://schemas.microsoft.com/office/drawing/2014/main" id="{8AE386F3-2DFC-4117-9793-35573E1679BB}"/>
               </a:ext>
             </a:extLst>
           </p:cNvPr>
@@ -6273,7 +6269,7 @@
           <a:p>
             <a:pPr algn="ctr"/>
             <a:r>
-              <a:rPr lang="en-US" sz="1050" dirty="0" err="1" smtClean="0">
+              <a:rPr lang="en-US" sz="1050" dirty="0" err="1">
                 <a:solidFill>
                   <a:srgbClr val="7030A0"/>
                 </a:solidFill>
@@ -6534,7 +6530,7 @@
           <a:p>
             <a:pPr algn="ctr"/>
             <a:r>
-              <a:rPr lang="en-US" sz="1050" dirty="0" err="1" smtClean="0">
+              <a:rPr lang="en-US" sz="1050" dirty="0" err="1">
                 <a:solidFill>
                   <a:srgbClr val="7030A0"/>
                 </a:solidFill>
@@ -6680,6 +6676,220 @@
             <a:endParaRPr lang="en-SG" sz="1050" b="1">
               <a:solidFill>
                 <a:srgbClr val="92D050"/>
+              </a:solidFill>
+            </a:endParaRPr>
+          </a:p>
+        </p:txBody>
+      </p:sp>
+      <p:cxnSp>
+        <p:nvCxnSpPr>
+          <p:cNvPr id="101" name="Elbow Connector 71">
+            <a:extLst>
+              <a:ext uri="{FF2B5EF4-FFF2-40B4-BE49-F238E27FC236}">
+                <a16:creationId xmlns:a16="http://schemas.microsoft.com/office/drawing/2014/main" id="{3274DDA3-AD47-418D-A302-813ABFFB2404}"/>
+              </a:ext>
+            </a:extLst>
+          </p:cNvPr>
+          <p:cNvCxnSpPr>
+            <a:cxnSpLocks/>
+          </p:cNvCxnSpPr>
+          <p:nvPr/>
+        </p:nvCxnSpPr>
+        <p:spPr>
+          <a:xfrm rot="16200000" flipH="1">
+            <a:off x="7438062" y="4374550"/>
+            <a:ext cx="313478" cy="218935"/>
+          </a:xfrm>
+          <a:prstGeom prst="bentConnector2">
+            <a:avLst/>
+          </a:prstGeom>
+          <a:ln w="19050">
+            <a:solidFill>
+              <a:srgbClr val="7030A0"/>
+            </a:solidFill>
+            <a:headEnd type="none" w="med" len="med"/>
+            <a:tailEnd type="arrow" w="med" len="med"/>
+          </a:ln>
+          <a:effectLst/>
+        </p:spPr>
+        <p:style>
+          <a:lnRef idx="1">
+            <a:schemeClr val="accent2"/>
+          </a:lnRef>
+          <a:fillRef idx="2">
+            <a:schemeClr val="accent2"/>
+          </a:fillRef>
+          <a:effectRef idx="1">
+            <a:schemeClr val="accent2"/>
+          </a:effectRef>
+          <a:fontRef idx="minor">
+            <a:schemeClr val="dk1"/>
+          </a:fontRef>
+        </p:style>
+      </p:cxnSp>
+      <p:cxnSp>
+        <p:nvCxnSpPr>
+          <p:cNvPr id="102" name="Elbow Connector 71">
+            <a:extLst>
+              <a:ext uri="{FF2B5EF4-FFF2-40B4-BE49-F238E27FC236}">
+                <a16:creationId xmlns:a16="http://schemas.microsoft.com/office/drawing/2014/main" id="{852FC246-9FB2-4D86-87FF-20537531B1C0}"/>
+              </a:ext>
+            </a:extLst>
+          </p:cNvPr>
+          <p:cNvCxnSpPr/>
+          <p:nvPr/>
+        </p:nvCxnSpPr>
+        <p:spPr>
+          <a:xfrm rot="5400000" flipH="1" flipV="1">
+            <a:off x="7438063" y="1822911"/>
+            <a:ext cx="313478" cy="218935"/>
+          </a:xfrm>
+          <a:prstGeom prst="bentConnector2">
+            <a:avLst/>
+          </a:prstGeom>
+          <a:ln w="19050">
+            <a:solidFill>
+              <a:srgbClr val="7030A0"/>
+            </a:solidFill>
+            <a:headEnd type="none" w="med" len="med"/>
+            <a:tailEnd type="arrow" w="med" len="med"/>
+          </a:ln>
+          <a:effectLst/>
+        </p:spPr>
+        <p:style>
+          <a:lnRef idx="1">
+            <a:schemeClr val="accent2"/>
+          </a:lnRef>
+          <a:fillRef idx="2">
+            <a:schemeClr val="accent2"/>
+          </a:fillRef>
+          <a:effectRef idx="1">
+            <a:schemeClr val="accent2"/>
+          </a:effectRef>
+          <a:fontRef idx="minor">
+            <a:schemeClr val="dk1"/>
+          </a:fontRef>
+        </p:style>
+      </p:cxnSp>
+      <p:sp>
+        <p:nvSpPr>
+          <p:cNvPr id="103" name="Rectangle 8">
+            <a:extLst>
+              <a:ext uri="{FF2B5EF4-FFF2-40B4-BE49-F238E27FC236}">
+                <a16:creationId xmlns:a16="http://schemas.microsoft.com/office/drawing/2014/main" id="{7B509C9C-C2FA-497D-A625-A4E9301C9224}"/>
+              </a:ext>
+            </a:extLst>
+          </p:cNvPr>
+          <p:cNvSpPr/>
+          <p:nvPr/>
+        </p:nvSpPr>
+        <p:spPr>
+          <a:xfrm>
+            <a:off x="7696805" y="1615437"/>
+            <a:ext cx="1049048" cy="285783"/>
+          </a:xfrm>
+          <a:prstGeom prst="rect">
+            <a:avLst/>
+          </a:prstGeom>
+          <a:ln w="19050">
+            <a:solidFill>
+              <a:srgbClr val="7030A0"/>
+            </a:solidFill>
+          </a:ln>
+          <a:effectLst/>
+        </p:spPr>
+        <p:style>
+          <a:lnRef idx="1">
+            <a:schemeClr val="accent4"/>
+          </a:lnRef>
+          <a:fillRef idx="2">
+            <a:schemeClr val="accent4"/>
+          </a:fillRef>
+          <a:effectRef idx="1">
+            <a:schemeClr val="accent4"/>
+          </a:effectRef>
+          <a:fontRef idx="minor">
+            <a:schemeClr val="dk1"/>
+          </a:fontRef>
+        </p:style>
+        <p:txBody>
+          <a:bodyPr rtlCol="0" anchor="ctr"/>
+          <a:lstStyle/>
+          <a:p>
+            <a:pPr algn="ctr"/>
+            <a:r>
+              <a:rPr lang="en-US" sz="1050" dirty="0">
+                <a:solidFill>
+                  <a:srgbClr val="7030A0"/>
+                </a:solidFill>
+              </a:rPr>
+              <a:t>Name</a:t>
+            </a:r>
+            <a:endParaRPr lang="en-SG" sz="1050" dirty="0">
+              <a:solidFill>
+                <a:srgbClr val="7030A0"/>
+              </a:solidFill>
+            </a:endParaRPr>
+          </a:p>
+        </p:txBody>
+      </p:sp>
+      <p:sp>
+        <p:nvSpPr>
+          <p:cNvPr id="104" name="Rectangle 8">
+            <a:extLst>
+              <a:ext uri="{FF2B5EF4-FFF2-40B4-BE49-F238E27FC236}">
+                <a16:creationId xmlns:a16="http://schemas.microsoft.com/office/drawing/2014/main" id="{0EE57B67-D2F3-436C-9ABF-1A85CE50B785}"/>
+              </a:ext>
+            </a:extLst>
+          </p:cNvPr>
+          <p:cNvSpPr/>
+          <p:nvPr/>
+        </p:nvSpPr>
+        <p:spPr>
+          <a:xfrm>
+            <a:off x="7704267" y="4522369"/>
+            <a:ext cx="1041585" cy="285783"/>
+          </a:xfrm>
+          <a:prstGeom prst="rect">
+            <a:avLst/>
+          </a:prstGeom>
+          <a:ln w="19050">
+            <a:solidFill>
+              <a:srgbClr val="7030A0"/>
+            </a:solidFill>
+          </a:ln>
+          <a:effectLst/>
+        </p:spPr>
+        <p:style>
+          <a:lnRef idx="1">
+            <a:schemeClr val="accent4"/>
+          </a:lnRef>
+          <a:fillRef idx="2">
+            <a:schemeClr val="accent4"/>
+          </a:fillRef>
+          <a:effectRef idx="1">
+            <a:schemeClr val="accent4"/>
+          </a:effectRef>
+          <a:fontRef idx="minor">
+            <a:schemeClr val="dk1"/>
+          </a:fontRef>
+        </p:style>
+        <p:txBody>
+          <a:bodyPr rtlCol="0" anchor="ctr"/>
+          <a:lstStyle/>
+          <a:p>
+            <a:pPr algn="ctr"/>
+            <a:r>
+              <a:rPr lang="en-US" sz="1050" dirty="0">
+                <a:solidFill>
+                  <a:srgbClr val="7030A0"/>
+                </a:solidFill>
+              </a:rPr>
+              <a:t>Recurrence</a:t>
+            </a:r>
+            <a:endParaRPr lang="en-SG" sz="1050" dirty="0">
+              <a:solidFill>
+                <a:srgbClr val="7030A0"/>
               </a:solidFill>
             </a:endParaRPr>
           </a:p>

</xml_diff>